<commit_message>
edit stirling.pptx  book-stacking integral-estimate geometric-sums
</commit_message>
<xml_diff>
--- a/spring13/slides13/book-stacking.pptx
+++ b/spring13/slides13/book-stacking.pptx
@@ -3783,22 +3783,16 @@
               <a:defRPr/>
             </a:pPr>
             <a:r>
-              <a:rPr lang="en-US" sz="1200" dirty="0" err="1">
+              <a:rPr lang="en-US" sz="1200" dirty="0" err="1" smtClean="0">
                 <a:latin typeface="Comic Sans MS" pitchFamily="66" charset="0"/>
               </a:rPr>
-              <a:t>lec</a:t>
-            </a:r>
-            <a:r>
-              <a:rPr lang="en-US" sz="1200" dirty="0">
-                <a:latin typeface="Comic Sans MS" pitchFamily="66" charset="0"/>
-              </a:rPr>
-              <a:t> </a:t>
+              <a:t>bookstack</a:t>
             </a:r>
             <a:r>
               <a:rPr lang="en-US" sz="1200" dirty="0" smtClean="0">
                 <a:latin typeface="Comic Sans MS" pitchFamily="66" charset="0"/>
               </a:rPr>
-              <a:t>8F.</a:t>
+              <a:t>.</a:t>
             </a:r>
             <a:fld id="{CE304688-B858-4773-B640-F1307E7715AE}" type="slidenum">
               <a:rPr lang="en-US" sz="1200" smtClean="0">
@@ -3898,7 +3892,22 @@
                 <a:uFillTx/>
                 <a:latin typeface="Comic Sans MS" pitchFamily="66" charset="0"/>
               </a:rPr>
-              <a:t>Albert R Meyer,             April 6, 2012</a:t>
+              <a:t>Albert R Meyer,             April </a:t>
+            </a:r>
+            <a:r>
+              <a:rPr kumimoji="0" lang="en-US" sz="1200" b="0" i="0" u="none" strike="noStrike" kern="1200" cap="none" spc="0" normalizeH="0" baseline="0" noProof="0" dirty="0" smtClean="0">
+                <a:ln>
+                  <a:noFill/>
+                </a:ln>
+                <a:solidFill>
+                  <a:schemeClr val="tx1"/>
+                </a:solidFill>
+                <a:effectLst/>
+                <a:uLnTx/>
+                <a:uFillTx/>
+                <a:latin typeface="Comic Sans MS" pitchFamily="66" charset="0"/>
+              </a:rPr>
+              <a:t>10, 2013</a:t>
             </a:r>
             <a:endParaRPr kumimoji="0" lang="en-US" sz="1200" b="0" i="0" u="none" strike="noStrike" kern="1200" cap="none" spc="0" normalizeH="0" baseline="0" noProof="0" dirty="0">
               <a:ln>
@@ -4485,14 +4494,14 @@
   <p:clrMapOvr>
     <a:masterClrMapping/>
   </p:clrMapOvr>
-  <mc:AlternateContent xmlns:mc="http://schemas.openxmlformats.org/markup-compatibility/2006" xmlns:p14="http://schemas.microsoft.com/office/powerpoint/2010/main">
-    <mc:Choice Requires="p14">
-      <p:transition spd="med" p14:dur="700">
+  <mc:AlternateContent xmlns:mc="http://schemas.openxmlformats.org/markup-compatibility/2006">
+    <mc:Choice xmlns:p14="http://schemas.microsoft.com/office/powerpoint/2010/main" Requires="p14">
+      <p:transition spd="med" p14:dur="700" advClick="0">
         <p:fade/>
       </p:transition>
     </mc:Choice>
-    <mc:Fallback xmlns="">
-      <p:transition xmlns:p14="http://schemas.microsoft.com/office/powerpoint/2010/main" spd="med">
+    <mc:Fallback>
+      <p:transition xmlns:p14="http://schemas.microsoft.com/office/powerpoint/2010/main" spd="med" advClick="0">
         <p:fade/>
       </p:transition>
     </mc:Fallback>
@@ -5290,14 +5299,14 @@
   <p:clrMapOvr>
     <a:masterClrMapping/>
   </p:clrMapOvr>
-  <mc:AlternateContent xmlns:mc="http://schemas.openxmlformats.org/markup-compatibility/2006" xmlns:p14="http://schemas.microsoft.com/office/powerpoint/2010/main">
-    <mc:Choice Requires="p14">
-      <p:transition spd="med" p14:dur="700">
+  <mc:AlternateContent xmlns:mc="http://schemas.openxmlformats.org/markup-compatibility/2006">
+    <mc:Choice xmlns:p14="http://schemas.microsoft.com/office/powerpoint/2010/main" Requires="p14">
+      <p:transition spd="med" p14:dur="700" advClick="0">
         <p:fade/>
       </p:transition>
     </mc:Choice>
-    <mc:Fallback xmlns="">
-      <p:transition xmlns:p14="http://schemas.microsoft.com/office/powerpoint/2010/main" spd="med">
+    <mc:Fallback>
+      <p:transition xmlns:p14="http://schemas.microsoft.com/office/powerpoint/2010/main" spd="med" advClick="0">
         <p:fade/>
       </p:transition>
     </mc:Fallback>
@@ -6279,7 +6288,7 @@
           <a:graphicData uri="http://schemas.openxmlformats.org/presentationml/2006/ole">
             <mc:AlternateContent xmlns:mc="http://schemas.openxmlformats.org/markup-compatibility/2006">
               <mc:Choice xmlns:v="urn:schemas-microsoft-com:vml" Requires="v">
-                <p:oleObj spid="_x0000_s10378" name="Equation" r:id="rId5" imgW="914400" imgH="179640" progId="Equation.DSMT4">
+                <p:oleObj spid="_x0000_s10383" name="Equation" r:id="rId5" imgW="914400" imgH="179640" progId="Equation.DSMT4">
                   <p:embed/>
                 </p:oleObj>
               </mc:Choice>
@@ -6509,7 +6518,7 @@
           <a:graphicData uri="http://schemas.openxmlformats.org/presentationml/2006/ole">
             <mc:AlternateContent xmlns:mc="http://schemas.openxmlformats.org/markup-compatibility/2006">
               <mc:Choice xmlns:v="urn:schemas-microsoft-com:vml" Requires="v">
-                <p:oleObj spid="_x0000_s10379" name="Equation" r:id="rId7" imgW="139700" imgH="406400" progId="Equation.DSMT4">
+                <p:oleObj spid="_x0000_s10384" name="Equation" r:id="rId7" imgW="139700" imgH="406400" progId="Equation.DSMT4">
                   <p:embed/>
                 </p:oleObj>
               </mc:Choice>
@@ -6595,18 +6604,9 @@
   <p:clrMapOvr>
     <a:masterClrMapping/>
   </p:clrMapOvr>
-  <mc:AlternateContent xmlns:mc="http://schemas.openxmlformats.org/markup-compatibility/2006" xmlns:p14="http://schemas.microsoft.com/office/powerpoint/2010/main">
-    <mc:Choice Requires="p14">
-      <p:transition spd="med" p14:dur="700">
-        <p:fade/>
-      </p:transition>
-    </mc:Choice>
-    <mc:Fallback xmlns="">
-      <p:transition xmlns:p14="http://schemas.microsoft.com/office/powerpoint/2010/main" spd="med">
-        <p:fade/>
-      </p:transition>
-    </mc:Fallback>
-  </mc:AlternateContent>
+  <p:transition xmlns:p14="http://schemas.microsoft.com/office/powerpoint/2010/main" spd="slow" advClick="0">
+    <p:fade thruBlk="1"/>
+  </p:transition>
   <p:timing>
     <p:tnLst>
       <p:par>
@@ -7353,14 +7353,14 @@
   <p:clrMapOvr>
     <a:masterClrMapping/>
   </p:clrMapOvr>
-  <mc:AlternateContent xmlns:mc="http://schemas.openxmlformats.org/markup-compatibility/2006" xmlns:p14="http://schemas.microsoft.com/office/powerpoint/2010/main">
-    <mc:Choice Requires="p14">
-      <p:transition spd="med" p14:dur="700">
+  <mc:AlternateContent xmlns:mc="http://schemas.openxmlformats.org/markup-compatibility/2006">
+    <mc:Choice xmlns:p14="http://schemas.microsoft.com/office/powerpoint/2010/main" Requires="p14">
+      <p:transition spd="med" p14:dur="700" advClick="0">
         <p:fade/>
       </p:transition>
     </mc:Choice>
-    <mc:Fallback xmlns="">
-      <p:transition xmlns:p14="http://schemas.microsoft.com/office/powerpoint/2010/main" spd="med">
+    <mc:Fallback>
+      <p:transition xmlns:p14="http://schemas.microsoft.com/office/powerpoint/2010/main" spd="med" advClick="0">
         <p:fade/>
       </p:transition>
     </mc:Fallback>
@@ -7551,7 +7551,7 @@
           <a:graphicData uri="http://schemas.openxmlformats.org/presentationml/2006/ole">
             <mc:AlternateContent xmlns:mc="http://schemas.openxmlformats.org/markup-compatibility/2006">
               <mc:Choice xmlns:v="urn:schemas-microsoft-com:vml" Requires="v">
-                <p:oleObj spid="_x0000_s12348" name="Equation" r:id="rId4" imgW="1968500" imgH="444500" progId="Equation.DSMT4">
+                <p:oleObj spid="_x0000_s12353" name="Equation" r:id="rId4" imgW="1968500" imgH="444500" progId="Equation.DSMT4">
                   <p:embed/>
                 </p:oleObj>
               </mc:Choice>
@@ -7681,7 +7681,7 @@
           <a:graphicData uri="http://schemas.openxmlformats.org/presentationml/2006/ole">
             <mc:AlternateContent xmlns:mc="http://schemas.openxmlformats.org/markup-compatibility/2006">
               <mc:Choice xmlns:v="urn:schemas-microsoft-com:vml" Requires="v">
-                <p:oleObj spid="_x0000_s12349" name="Equation" r:id="rId6" imgW="1765300" imgH="495300" progId="Equation.DSMT4">
+                <p:oleObj spid="_x0000_s12354" name="Equation" r:id="rId6" imgW="1765300" imgH="495300" progId="Equation.DSMT4">
                   <p:embed/>
                 </p:oleObj>
               </mc:Choice>
@@ -7721,14 +7721,14 @@
   <p:clrMapOvr>
     <a:masterClrMapping/>
   </p:clrMapOvr>
-  <mc:AlternateContent xmlns:mc="http://schemas.openxmlformats.org/markup-compatibility/2006" xmlns:p14="http://schemas.microsoft.com/office/powerpoint/2010/main">
-    <mc:Choice Requires="p14">
-      <p:transition spd="med" p14:dur="700">
+  <mc:AlternateContent xmlns:mc="http://schemas.openxmlformats.org/markup-compatibility/2006">
+    <mc:Choice xmlns:p14="http://schemas.microsoft.com/office/powerpoint/2010/main" Requires="p14">
+      <p:transition spd="med" p14:dur="700" advClick="0">
         <p:fade/>
       </p:transition>
     </mc:Choice>
-    <mc:Fallback xmlns="">
-      <p:transition xmlns:p14="http://schemas.microsoft.com/office/powerpoint/2010/main" spd="med">
+    <mc:Fallback>
+      <p:transition xmlns:p14="http://schemas.microsoft.com/office/powerpoint/2010/main" spd="med" advClick="0">
         <p:fade/>
       </p:transition>
     </mc:Fallback>
@@ -8155,7 +8155,7 @@
           <a:graphicData uri="http://schemas.openxmlformats.org/presentationml/2006/ole">
             <mc:AlternateContent xmlns:mc="http://schemas.openxmlformats.org/markup-compatibility/2006">
               <mc:Choice xmlns:v="urn:schemas-microsoft-com:vml" Requires="v">
-                <p:oleObj spid="_x0000_s18446" name="Equation" r:id="rId4" imgW="2222500" imgH="444500" progId="Equation.DSMT4">
+                <p:oleObj spid="_x0000_s18449" name="Equation" r:id="rId4" imgW="2222500" imgH="444500" progId="Equation.DSMT4">
                   <p:embed/>
                 </p:oleObj>
               </mc:Choice>
@@ -8273,14 +8273,14 @@
   <p:clrMapOvr>
     <a:masterClrMapping/>
   </p:clrMapOvr>
-  <mc:AlternateContent xmlns:mc="http://schemas.openxmlformats.org/markup-compatibility/2006" xmlns:p14="http://schemas.microsoft.com/office/powerpoint/2010/main">
-    <mc:Choice Requires="p14">
-      <p:transition spd="med" p14:dur="700">
+  <mc:AlternateContent xmlns:mc="http://schemas.openxmlformats.org/markup-compatibility/2006">
+    <mc:Choice xmlns:p14="http://schemas.microsoft.com/office/powerpoint/2010/main" Requires="p14">
+      <p:transition spd="med" p14:dur="700" advClick="0">
         <p:fade/>
       </p:transition>
     </mc:Choice>
-    <mc:Fallback xmlns="">
-      <p:transition xmlns:p14="http://schemas.microsoft.com/office/powerpoint/2010/main" spd="med">
+    <mc:Fallback>
+      <p:transition xmlns:p14="http://schemas.microsoft.com/office/powerpoint/2010/main" spd="med" advClick="0">
         <p:fade/>
       </p:transition>
     </mc:Fallback>
@@ -8889,14 +8889,14 @@
   <p:clrMapOvr>
     <a:masterClrMapping/>
   </p:clrMapOvr>
-  <mc:AlternateContent xmlns:mc="http://schemas.openxmlformats.org/markup-compatibility/2006" xmlns:p14="http://schemas.microsoft.com/office/powerpoint/2010/main">
-    <mc:Choice Requires="p14">
-      <p:transition spd="med" p14:dur="700">
+  <mc:AlternateContent xmlns:mc="http://schemas.openxmlformats.org/markup-compatibility/2006">
+    <mc:Choice xmlns:p14="http://schemas.microsoft.com/office/powerpoint/2010/main" Requires="p14">
+      <p:transition spd="med" p14:dur="700" advClick="0">
         <p:fade/>
       </p:transition>
     </mc:Choice>
-    <mc:Fallback xmlns="">
-      <p:transition xmlns:p14="http://schemas.microsoft.com/office/powerpoint/2010/main" spd="med">
+    <mc:Fallback>
+      <p:transition xmlns:p14="http://schemas.microsoft.com/office/powerpoint/2010/main" spd="med" advClick="0">
         <p:fade/>
       </p:transition>
     </mc:Fallback>
@@ -8950,7 +8950,7 @@
           <a:graphicData uri="http://schemas.openxmlformats.org/presentationml/2006/ole">
             <mc:AlternateContent xmlns:mc="http://schemas.openxmlformats.org/markup-compatibility/2006">
               <mc:Choice xmlns:v="urn:schemas-microsoft-com:vml" Requires="v">
-                <p:oleObj spid="_x0000_s1057" name="Equation" r:id="rId5" imgW="1206500" imgH="533400" progId="Equation.DSMT4">
+                <p:oleObj spid="_x0000_s1060" name="Equation" r:id="rId5" imgW="1206500" imgH="533400" progId="Equation.DSMT4">
                   <p:embed/>
                 </p:oleObj>
               </mc:Choice>
@@ -9735,7 +9735,7 @@
   <p:clrMapOvr>
     <a:masterClrMapping/>
   </p:clrMapOvr>
-  <p:transition xmlns:p14="http://schemas.microsoft.com/office/powerpoint/2010/main">
+  <p:transition xmlns:p14="http://schemas.microsoft.com/office/powerpoint/2010/main" advClick="0">
     <p:fade/>
   </p:transition>
   <p:timing>
@@ -10868,7 +10868,7 @@
           <a:graphicData uri="http://schemas.openxmlformats.org/presentationml/2006/ole">
             <mc:AlternateContent xmlns:mc="http://schemas.openxmlformats.org/markup-compatibility/2006">
               <mc:Choice xmlns:v="urn:schemas-microsoft-com:vml" Requires="v">
-                <p:oleObj spid="_x0000_s20490" name="Equation" r:id="rId5" imgW="914400" imgH="179640" progId="Equation.DSMT4">
+                <p:oleObj spid="_x0000_s20495" name="Equation" r:id="rId5" imgW="914400" imgH="179640" progId="Equation.DSMT4">
                   <p:embed/>
                 </p:oleObj>
               </mc:Choice>
@@ -11098,7 +11098,7 @@
           <a:graphicData uri="http://schemas.openxmlformats.org/presentationml/2006/ole">
             <mc:AlternateContent xmlns:mc="http://schemas.openxmlformats.org/markup-compatibility/2006">
               <mc:Choice xmlns:v="urn:schemas-microsoft-com:vml" Requires="v">
-                <p:oleObj spid="_x0000_s20491" name="Equation" r:id="rId7" imgW="139700" imgH="406400" progId="Equation.DSMT4">
+                <p:oleObj spid="_x0000_s20496" name="Equation" r:id="rId7" imgW="139700" imgH="406400" progId="Equation.DSMT4">
                   <p:embed/>
                 </p:oleObj>
               </mc:Choice>
@@ -11191,12 +11191,12 @@
   </p:clrMapOvr>
   <mc:AlternateContent xmlns:mc="http://schemas.openxmlformats.org/markup-compatibility/2006">
     <mc:Choice xmlns:p14="http://schemas.microsoft.com/office/powerpoint/2010/main" Requires="p14">
-      <p:transition spd="slow" p14:dur="900" advClick="0" advTm="1000">
+      <p:transition spd="slow" p14:dur="900" advClick="0">
         <p:fade/>
       </p:transition>
     </mc:Choice>
     <mc:Fallback>
-      <p:transition xmlns:p14="http://schemas.microsoft.com/office/powerpoint/2010/main" spd="slow" advClick="0" advTm="1000">
+      <p:transition xmlns:p14="http://schemas.microsoft.com/office/powerpoint/2010/main" spd="slow" advClick="0">
         <p:fade/>
       </p:transition>
     </mc:Fallback>
@@ -12034,7 +12034,7 @@
           <a:graphicData uri="http://schemas.openxmlformats.org/presentationml/2006/ole">
             <mc:AlternateContent xmlns:mc="http://schemas.openxmlformats.org/markup-compatibility/2006">
               <mc:Choice xmlns:v="urn:schemas-microsoft-com:vml" Requires="v">
-                <p:oleObj spid="_x0000_s13499" name="Equation" r:id="rId4" imgW="914400" imgH="179640" progId="Equation.DSMT4">
+                <p:oleObj spid="_x0000_s13510" name="Equation" r:id="rId4" imgW="914400" imgH="179640" progId="Equation.DSMT4">
                   <p:embed/>
                 </p:oleObj>
               </mc:Choice>
@@ -12104,7 +12104,7 @@
           <a:graphicData uri="http://schemas.openxmlformats.org/presentationml/2006/ole">
             <mc:AlternateContent xmlns:mc="http://schemas.openxmlformats.org/markup-compatibility/2006">
               <mc:Choice xmlns:v="urn:schemas-microsoft-com:vml" Requires="v">
-                <p:oleObj spid="_x0000_s13500" name="Equation" r:id="rId6" imgW="215640" imgH="355320" progId="Equation.DSMT4">
+                <p:oleObj spid="_x0000_s13511" name="Equation" r:id="rId6" imgW="215640" imgH="355320" progId="Equation.DSMT4">
                   <p:embed/>
                 </p:oleObj>
               </mc:Choice>
@@ -12174,7 +12174,7 @@
           <a:graphicData uri="http://schemas.openxmlformats.org/presentationml/2006/ole">
             <mc:AlternateContent xmlns:mc="http://schemas.openxmlformats.org/markup-compatibility/2006">
               <mc:Choice xmlns:v="urn:schemas-microsoft-com:vml" Requires="v">
-                <p:oleObj spid="_x0000_s13501" name="Equation" r:id="rId8" imgW="215640" imgH="355320" progId="Equation.DSMT4">
+                <p:oleObj spid="_x0000_s13512" name="Equation" r:id="rId8" imgW="215640" imgH="355320" progId="Equation.DSMT4">
                   <p:embed/>
                 </p:oleObj>
               </mc:Choice>
@@ -12404,7 +12404,7 @@
           <a:graphicData uri="http://schemas.openxmlformats.org/presentationml/2006/ole">
             <mc:AlternateContent xmlns:mc="http://schemas.openxmlformats.org/markup-compatibility/2006">
               <mc:Choice xmlns:v="urn:schemas-microsoft-com:vml" Requires="v">
-                <p:oleObj spid="_x0000_s13502" name="Equation" r:id="rId10" imgW="520560" imgH="419040" progId="Equation.DSMT4">
+                <p:oleObj spid="_x0000_s13513" name="Equation" r:id="rId10" imgW="520560" imgH="419040" progId="Equation.DSMT4">
                   <p:embed/>
                 </p:oleObj>
               </mc:Choice>
@@ -12474,7 +12474,7 @@
           <a:graphicData uri="http://schemas.openxmlformats.org/presentationml/2006/ole">
             <mc:AlternateContent xmlns:mc="http://schemas.openxmlformats.org/markup-compatibility/2006">
               <mc:Choice xmlns:v="urn:schemas-microsoft-com:vml" Requires="v">
-                <p:oleObj spid="_x0000_s13503" name="Equation" r:id="rId12" imgW="139700" imgH="406400" progId="Equation.DSMT4">
+                <p:oleObj spid="_x0000_s13514" name="Equation" r:id="rId12" imgW="139700" imgH="406400" progId="Equation.DSMT4">
                   <p:embed/>
                 </p:oleObj>
               </mc:Choice>
@@ -12559,12 +12559,12 @@
   </p:clrMapOvr>
   <mc:AlternateContent xmlns:mc="http://schemas.openxmlformats.org/markup-compatibility/2006">
     <mc:Choice xmlns:p14="http://schemas.microsoft.com/office/powerpoint/2010/main" Requires="p14">
-      <p:transition spd="med" p14:dur="700">
+      <p:transition spd="med" p14:dur="700" advClick="0">
         <p:fade/>
       </p:transition>
     </mc:Choice>
     <mc:Fallback>
-      <p:transition xmlns:p14="http://schemas.microsoft.com/office/powerpoint/2010/main" spd="med">
+      <p:transition xmlns:p14="http://schemas.microsoft.com/office/powerpoint/2010/main" spd="med" advClick="0">
         <p:fade/>
       </p:transition>
     </mc:Fallback>
@@ -12794,7 +12794,7 @@
           <a:graphicData uri="http://schemas.openxmlformats.org/presentationml/2006/ole">
             <mc:AlternateContent xmlns:mc="http://schemas.openxmlformats.org/markup-compatibility/2006">
               <mc:Choice xmlns:v="urn:schemas-microsoft-com:vml" Requires="v">
-                <p:oleObj spid="_x0000_s14419" name="Equation" r:id="rId5" imgW="520560" imgH="419040" progId="Equation.DSMT4">
+                <p:oleObj spid="_x0000_s14424" name="Equation" r:id="rId5" imgW="520560" imgH="419040" progId="Equation.DSMT4">
                   <p:embed/>
                 </p:oleObj>
               </mc:Choice>
@@ -12946,7 +12946,7 @@
           <a:graphicData uri="http://schemas.openxmlformats.org/presentationml/2006/ole">
             <mc:AlternateContent xmlns:mc="http://schemas.openxmlformats.org/markup-compatibility/2006">
               <mc:Choice xmlns:v="urn:schemas-microsoft-com:vml" Requires="v">
-                <p:oleObj spid="_x0000_s14420" name="Equation" r:id="rId7" imgW="1295400" imgH="469900" progId="Equation.3">
+                <p:oleObj spid="_x0000_s14425" name="Equation" r:id="rId7" imgW="1295400" imgH="469900" progId="Equation.3">
                   <p:embed/>
                 </p:oleObj>
               </mc:Choice>
@@ -13027,14 +13027,14 @@
   <p:clrMapOvr>
     <a:masterClrMapping/>
   </p:clrMapOvr>
-  <mc:AlternateContent xmlns:mc="http://schemas.openxmlformats.org/markup-compatibility/2006" xmlns:p14="http://schemas.microsoft.com/office/powerpoint/2010/main">
-    <mc:Choice Requires="p14">
-      <p:transition spd="slow" p14:dur="1200">
+  <mc:AlternateContent xmlns:mc="http://schemas.openxmlformats.org/markup-compatibility/2006">
+    <mc:Choice xmlns:p14="http://schemas.microsoft.com/office/powerpoint/2010/main" Requires="p14">
+      <p:transition spd="slow" p14:dur="1200" advClick="0">
         <p:fade thruBlk="1"/>
       </p:transition>
     </mc:Choice>
-    <mc:Fallback xmlns="">
-      <p:transition xmlns:p14="http://schemas.microsoft.com/office/powerpoint/2010/main" spd="slow">
+    <mc:Fallback>
+      <p:transition xmlns:p14="http://schemas.microsoft.com/office/powerpoint/2010/main" spd="slow" advClick="0">
         <p:fade thruBlk="1"/>
       </p:transition>
     </mc:Fallback>
@@ -13710,14 +13710,14 @@
   <p:clrMapOvr>
     <a:masterClrMapping/>
   </p:clrMapOvr>
-  <mc:AlternateContent xmlns:mc="http://schemas.openxmlformats.org/markup-compatibility/2006" xmlns:p14="http://schemas.microsoft.com/office/powerpoint/2010/main">
-    <mc:Choice Requires="p14">
-      <p:transition spd="med" p14:dur="700">
+  <mc:AlternateContent xmlns:mc="http://schemas.openxmlformats.org/markup-compatibility/2006">
+    <mc:Choice xmlns:p14="http://schemas.microsoft.com/office/powerpoint/2010/main" Requires="p14">
+      <p:transition spd="med" p14:dur="700" advClick="0">
         <p:fade/>
       </p:transition>
     </mc:Choice>
-    <mc:Fallback xmlns="">
-      <p:transition xmlns:p14="http://schemas.microsoft.com/office/powerpoint/2010/main" spd="med">
+    <mc:Fallback>
+      <p:transition xmlns:p14="http://schemas.microsoft.com/office/powerpoint/2010/main" spd="med" advClick="0">
         <p:fade/>
       </p:transition>
     </mc:Fallback>
@@ -13771,7 +13771,7 @@
           <a:graphicData uri="http://schemas.openxmlformats.org/presentationml/2006/ole">
             <mc:AlternateContent xmlns:mc="http://schemas.openxmlformats.org/markup-compatibility/2006">
               <mc:Choice xmlns:v="urn:schemas-microsoft-com:vml" Requires="v">
-                <p:oleObj spid="_x0000_s15407" name="Equation" r:id="rId5" imgW="1422400" imgH="419100" progId="Equation.3">
+                <p:oleObj spid="_x0000_s15410" name="Equation" r:id="rId5" imgW="1422400" imgH="419100" progId="Equation.3">
                   <p:embed/>
                 </p:oleObj>
               </mc:Choice>
@@ -14004,14 +14004,14 @@
   <p:clrMapOvr>
     <a:masterClrMapping/>
   </p:clrMapOvr>
-  <mc:AlternateContent xmlns:mc="http://schemas.openxmlformats.org/markup-compatibility/2006" xmlns:p14="http://schemas.microsoft.com/office/powerpoint/2010/main">
-    <mc:Choice Requires="p14">
-      <p:transition spd="med" p14:dur="700">
+  <mc:AlternateContent xmlns:mc="http://schemas.openxmlformats.org/markup-compatibility/2006">
+    <mc:Choice xmlns:p14="http://schemas.microsoft.com/office/powerpoint/2010/main" Requires="p14">
+      <p:transition spd="med" p14:dur="700" advClick="0">
         <p:fade/>
       </p:transition>
     </mc:Choice>
-    <mc:Fallback xmlns="">
-      <p:transition xmlns:p14="http://schemas.microsoft.com/office/powerpoint/2010/main" spd="med">
+    <mc:Fallback>
+      <p:transition xmlns:p14="http://schemas.microsoft.com/office/powerpoint/2010/main" spd="med" advClick="0">
         <p:fade/>
       </p:transition>
     </mc:Fallback>
@@ -14728,14 +14728,14 @@
   <p:clrMapOvr>
     <a:masterClrMapping/>
   </p:clrMapOvr>
-  <mc:AlternateContent xmlns:mc="http://schemas.openxmlformats.org/markup-compatibility/2006" xmlns:p14="http://schemas.microsoft.com/office/powerpoint/2010/main">
-    <mc:Choice Requires="p14">
-      <p:transition spd="med" p14:dur="700">
+  <mc:AlternateContent xmlns:mc="http://schemas.openxmlformats.org/markup-compatibility/2006">
+    <mc:Choice xmlns:p14="http://schemas.microsoft.com/office/powerpoint/2010/main" Requires="p14">
+      <p:transition spd="med" p14:dur="700" advClick="0">
         <p:fade/>
       </p:transition>
     </mc:Choice>
-    <mc:Fallback xmlns="">
-      <p:transition xmlns:p14="http://schemas.microsoft.com/office/powerpoint/2010/main" spd="med">
+    <mc:Fallback>
+      <p:transition xmlns:p14="http://schemas.microsoft.com/office/powerpoint/2010/main" spd="med" advClick="0">
         <p:fade/>
       </p:transition>
     </mc:Fallback>
@@ -15271,14 +15271,14 @@
   <p:clrMapOvr>
     <a:masterClrMapping/>
   </p:clrMapOvr>
-  <mc:AlternateContent xmlns:mc="http://schemas.openxmlformats.org/markup-compatibility/2006" xmlns:p14="http://schemas.microsoft.com/office/powerpoint/2010/main">
-    <mc:Choice Requires="p14">
-      <p:transition spd="med" p14:dur="700">
+  <mc:AlternateContent xmlns:mc="http://schemas.openxmlformats.org/markup-compatibility/2006">
+    <mc:Choice xmlns:p14="http://schemas.microsoft.com/office/powerpoint/2010/main" Requires="p14">
+      <p:transition spd="med" p14:dur="700" advClick="0">
         <p:fade/>
       </p:transition>
     </mc:Choice>
-    <mc:Fallback xmlns="">
-      <p:transition xmlns:p14="http://schemas.microsoft.com/office/powerpoint/2010/main" spd="med">
+    <mc:Fallback>
+      <p:transition xmlns:p14="http://schemas.microsoft.com/office/powerpoint/2010/main" spd="med" advClick="0">
         <p:fade/>
       </p:transition>
     </mc:Fallback>
@@ -15814,14 +15814,14 @@
   <p:clrMapOvr>
     <a:masterClrMapping/>
   </p:clrMapOvr>
-  <mc:AlternateContent xmlns:mc="http://schemas.openxmlformats.org/markup-compatibility/2006" xmlns:p14="http://schemas.microsoft.com/office/powerpoint/2010/main">
-    <mc:Choice Requires="p14">
-      <p:transition spd="med" p14:dur="700">
+  <mc:AlternateContent xmlns:mc="http://schemas.openxmlformats.org/markup-compatibility/2006">
+    <mc:Choice xmlns:p14="http://schemas.microsoft.com/office/powerpoint/2010/main" Requires="p14">
+      <p:transition spd="med" p14:dur="700" advClick="0">
         <p:fade/>
       </p:transition>
     </mc:Choice>
-    <mc:Fallback xmlns="">
-      <p:transition xmlns:p14="http://schemas.microsoft.com/office/powerpoint/2010/main" spd="med">
+    <mc:Fallback>
+      <p:transition xmlns:p14="http://schemas.microsoft.com/office/powerpoint/2010/main" spd="med" advClick="0">
         <p:fade/>
       </p:transition>
     </mc:Fallback>
@@ -16801,7 +16801,7 @@
           <a:graphicData uri="http://schemas.openxmlformats.org/presentationml/2006/ole">
             <mc:AlternateContent xmlns:mc="http://schemas.openxmlformats.org/markup-compatibility/2006">
               <mc:Choice xmlns:v="urn:schemas-microsoft-com:vml" Requires="v">
-                <p:oleObj spid="_x0000_s17421" name="Equation" r:id="rId5" imgW="292100" imgH="469900" progId="Equation.DSMT4">
+                <p:oleObj spid="_x0000_s17424" name="Equation" r:id="rId5" imgW="292100" imgH="469900" progId="Equation.DSMT4">
                   <p:embed/>
                 </p:oleObj>
               </mc:Choice>
@@ -16841,14 +16841,14 @@
   <p:clrMapOvr>
     <a:masterClrMapping/>
   </p:clrMapOvr>
-  <mc:AlternateContent xmlns:mc="http://schemas.openxmlformats.org/markup-compatibility/2006" xmlns:p14="http://schemas.microsoft.com/office/powerpoint/2010/main">
-    <mc:Choice Requires="p14">
-      <p:transition spd="med" p14:dur="700">
+  <mc:AlternateContent xmlns:mc="http://schemas.openxmlformats.org/markup-compatibility/2006">
+    <mc:Choice xmlns:p14="http://schemas.microsoft.com/office/powerpoint/2010/main" Requires="p14">
+      <p:transition spd="med" p14:dur="700" advClick="0">
         <p:fade/>
       </p:transition>
     </mc:Choice>
-    <mc:Fallback xmlns="">
-      <p:transition xmlns:p14="http://schemas.microsoft.com/office/powerpoint/2010/main" spd="med">
+    <mc:Fallback>
+      <p:transition xmlns:p14="http://schemas.microsoft.com/office/powerpoint/2010/main" spd="med" advClick="0">
         <p:fade/>
       </p:transition>
     </mc:Fallback>
@@ -17535,14 +17535,14 @@
   <p:clrMapOvr>
     <a:masterClrMapping/>
   </p:clrMapOvr>
-  <mc:AlternateContent xmlns:mc="http://schemas.openxmlformats.org/markup-compatibility/2006" xmlns:p14="http://schemas.microsoft.com/office/powerpoint/2010/main">
-    <mc:Choice Requires="p14">
-      <p:transition spd="med" p14:dur="700">
+  <mc:AlternateContent xmlns:mc="http://schemas.openxmlformats.org/markup-compatibility/2006">
+    <mc:Choice xmlns:p14="http://schemas.microsoft.com/office/powerpoint/2010/main" Requires="p14">
+      <p:transition spd="med" p14:dur="700" advClick="0">
         <p:fade/>
       </p:transition>
     </mc:Choice>
-    <mc:Fallback xmlns="">
-      <p:transition xmlns:p14="http://schemas.microsoft.com/office/powerpoint/2010/main" spd="med">
+    <mc:Fallback>
+      <p:transition xmlns:p14="http://schemas.microsoft.com/office/powerpoint/2010/main" spd="med" advClick="0">
         <p:fade/>
       </p:transition>
     </mc:Fallback>
@@ -18252,14 +18252,14 @@
   <p:clrMapOvr>
     <a:masterClrMapping/>
   </p:clrMapOvr>
-  <mc:AlternateContent xmlns:mc="http://schemas.openxmlformats.org/markup-compatibility/2006" xmlns:p14="http://schemas.microsoft.com/office/powerpoint/2010/main">
-    <mc:Choice Requires="p14">
-      <p:transition spd="med" p14:dur="700">
+  <mc:AlternateContent xmlns:mc="http://schemas.openxmlformats.org/markup-compatibility/2006">
+    <mc:Choice xmlns:p14="http://schemas.microsoft.com/office/powerpoint/2010/main" Requires="p14">
+      <p:transition spd="med" p14:dur="700" advClick="0">
         <p:fade/>
       </p:transition>
     </mc:Choice>
-    <mc:Fallback xmlns="">
-      <p:transition xmlns:p14="http://schemas.microsoft.com/office/powerpoint/2010/main" spd="med">
+    <mc:Fallback>
+      <p:transition xmlns:p14="http://schemas.microsoft.com/office/powerpoint/2010/main" spd="med" advClick="0">
         <p:fade/>
       </p:transition>
     </mc:Fallback>
@@ -18840,14 +18840,14 @@
   <p:clrMapOvr>
     <a:masterClrMapping/>
   </p:clrMapOvr>
-  <mc:AlternateContent xmlns:mc="http://schemas.openxmlformats.org/markup-compatibility/2006" xmlns:p14="http://schemas.microsoft.com/office/powerpoint/2010/main">
-    <mc:Choice Requires="p14">
-      <p:transition spd="med" p14:dur="700">
+  <mc:AlternateContent xmlns:mc="http://schemas.openxmlformats.org/markup-compatibility/2006">
+    <mc:Choice xmlns:p14="http://schemas.microsoft.com/office/powerpoint/2010/main" Requires="p14">
+      <p:transition spd="med" p14:dur="700" advClick="0">
         <p:fade/>
       </p:transition>
     </mc:Choice>
-    <mc:Fallback xmlns="">
-      <p:transition xmlns:p14="http://schemas.microsoft.com/office/powerpoint/2010/main" spd="med">
+    <mc:Fallback>
+      <p:transition xmlns:p14="http://schemas.microsoft.com/office/powerpoint/2010/main" spd="med" advClick="0">
         <p:fade/>
       </p:transition>
     </mc:Fallback>

</xml_diff>